<commit_message>
491	Add compute_heuristics to cbs
</commit_message>
<xml_diff>
--- a/npbenchmark-main/MAPF/CBS-LNS.pptx
+++ b/npbenchmark-main/MAPF/CBS-LNS.pptx
@@ -5,12 +5,13 @@
     <p:sldMasterId id="2147483648" r:id="rId1"/>
   </p:sldMasterIdLst>
   <p:notesMasterIdLst>
-    <p:notesMasterId r:id="rId5"/>
+    <p:notesMasterId r:id="rId6"/>
   </p:notesMasterIdLst>
   <p:sldIdLst>
     <p:sldId id="260" r:id="rId2"/>
     <p:sldId id="269" r:id="rId3"/>
     <p:sldId id="270" r:id="rId4"/>
+    <p:sldId id="271" r:id="rId5"/>
   </p:sldIdLst>
   <p:sldSz cx="12192000" cy="6858000"/>
   <p:notesSz cx="6858000" cy="9144000"/>
@@ -199,7 +200,7 @@
           <a:p>
             <a:fld id="{9434482F-FE80-4FB5-B47D-261F06A57F81}" type="datetimeFigureOut">
               <a:rPr lang="zh-CN" altLang="en-US" smtClean="0"/>
-              <a:t>2023/8/24</a:t>
+              <a:t>2023/8/26</a:t>
             </a:fld>
             <a:endParaRPr lang="zh-CN" altLang="en-US"/>
           </a:p>
@@ -634,6 +635,90 @@
 </p:notes>
 </file>
 
+<file path=ppt/notesSlides/notesSlide3.xml><?xml version="1.0" encoding="utf-8"?>
+<p:notes xmlns:a="http://schemas.openxmlformats.org/drawingml/2006/main" xmlns:r="http://schemas.openxmlformats.org/officeDocument/2006/relationships" xmlns:p="http://schemas.openxmlformats.org/presentationml/2006/main">
+  <p:cSld>
+    <p:spTree>
+      <p:nvGrpSpPr>
+        <p:cNvPr id="1" name=""/>
+        <p:cNvGrpSpPr/>
+        <p:nvPr/>
+      </p:nvGrpSpPr>
+      <p:grpSpPr>
+        <a:xfrm>
+          <a:off x="0" y="0"/>
+          <a:ext cx="0" cy="0"/>
+          <a:chOff x="0" y="0"/>
+          <a:chExt cx="0" cy="0"/>
+        </a:xfrm>
+      </p:grpSpPr>
+      <p:sp>
+        <p:nvSpPr>
+          <p:cNvPr id="2" name="幻灯片图像占位符 1"/>
+          <p:cNvSpPr>
+            <a:spLocks noGrp="1" noRot="1" noChangeAspect="1"/>
+          </p:cNvSpPr>
+          <p:nvPr>
+            <p:ph type="sldImg"/>
+          </p:nvPr>
+        </p:nvSpPr>
+        <p:spPr/>
+      </p:sp>
+      <p:sp>
+        <p:nvSpPr>
+          <p:cNvPr id="3" name="备注占位符 2"/>
+          <p:cNvSpPr>
+            <a:spLocks noGrp="1"/>
+          </p:cNvSpPr>
+          <p:nvPr>
+            <p:ph type="body" idx="1"/>
+          </p:nvPr>
+        </p:nvSpPr>
+        <p:spPr/>
+        <p:txBody>
+          <a:bodyPr/>
+          <a:lstStyle/>
+          <a:p>
+            <a:endParaRPr lang="zh-CN" altLang="en-US" dirty="0"/>
+          </a:p>
+        </p:txBody>
+      </p:sp>
+      <p:sp>
+        <p:nvSpPr>
+          <p:cNvPr id="4" name="灯片编号占位符 3"/>
+          <p:cNvSpPr>
+            <a:spLocks noGrp="1"/>
+          </p:cNvSpPr>
+          <p:nvPr>
+            <p:ph type="sldNum" sz="quarter" idx="5"/>
+          </p:nvPr>
+        </p:nvSpPr>
+        <p:spPr/>
+        <p:txBody>
+          <a:bodyPr/>
+          <a:lstStyle/>
+          <a:p>
+            <a:fld id="{08FA035D-5F83-4DF7-BABA-C3479DD748DE}" type="slidenum">
+              <a:rPr lang="zh-CN" altLang="en-US" smtClean="0"/>
+              <a:t>3</a:t>
+            </a:fld>
+            <a:endParaRPr lang="zh-CN" altLang="en-US"/>
+          </a:p>
+        </p:txBody>
+      </p:sp>
+    </p:spTree>
+    <p:extLst>
+      <p:ext uri="{BB962C8B-B14F-4D97-AF65-F5344CB8AC3E}">
+        <p14:creationId xmlns:p14="http://schemas.microsoft.com/office/powerpoint/2010/main" val="2058545548"/>
+      </p:ext>
+    </p:extLst>
+  </p:cSld>
+  <p:clrMapOvr>
+    <a:masterClrMapping/>
+  </p:clrMapOvr>
+</p:notes>
+</file>
+
 <file path=ppt/slideLayouts/slideLayout1.xml><?xml version="1.0" encoding="utf-8"?>
 <p:sldLayout xmlns:a="http://schemas.openxmlformats.org/drawingml/2006/main" xmlns:r="http://schemas.openxmlformats.org/officeDocument/2006/relationships" xmlns:p="http://schemas.openxmlformats.org/presentationml/2006/main" type="title" preserve="1">
   <p:cSld name="标题幻灯片">
@@ -781,7 +866,7 @@
           <a:p>
             <a:fld id="{2D8FB3AA-4DD9-41F8-ACA7-529CA5B761B9}" type="datetimeFigureOut">
               <a:rPr lang="zh-CN" altLang="en-US" smtClean="0"/>
-              <a:t>2023/8/24</a:t>
+              <a:t>2023/8/26</a:t>
             </a:fld>
             <a:endParaRPr lang="zh-CN" altLang="en-US"/>
           </a:p>
@@ -979,7 +1064,7 @@
           <a:p>
             <a:fld id="{2D8FB3AA-4DD9-41F8-ACA7-529CA5B761B9}" type="datetimeFigureOut">
               <a:rPr lang="zh-CN" altLang="en-US" smtClean="0"/>
-              <a:t>2023/8/24</a:t>
+              <a:t>2023/8/26</a:t>
             </a:fld>
             <a:endParaRPr lang="zh-CN" altLang="en-US"/>
           </a:p>
@@ -1187,7 +1272,7 @@
           <a:p>
             <a:fld id="{2D8FB3AA-4DD9-41F8-ACA7-529CA5B761B9}" type="datetimeFigureOut">
               <a:rPr lang="zh-CN" altLang="en-US" smtClean="0"/>
-              <a:t>2023/8/24</a:t>
+              <a:t>2023/8/26</a:t>
             </a:fld>
             <a:endParaRPr lang="zh-CN" altLang="en-US"/>
           </a:p>
@@ -1385,7 +1470,7 @@
           <a:p>
             <a:fld id="{2D8FB3AA-4DD9-41F8-ACA7-529CA5B761B9}" type="datetimeFigureOut">
               <a:rPr lang="zh-CN" altLang="en-US" smtClean="0"/>
-              <a:t>2023/8/24</a:t>
+              <a:t>2023/8/26</a:t>
             </a:fld>
             <a:endParaRPr lang="zh-CN" altLang="en-US"/>
           </a:p>
@@ -1660,7 +1745,7 @@
           <a:p>
             <a:fld id="{2D8FB3AA-4DD9-41F8-ACA7-529CA5B761B9}" type="datetimeFigureOut">
               <a:rPr lang="zh-CN" altLang="en-US" smtClean="0"/>
-              <a:t>2023/8/24</a:t>
+              <a:t>2023/8/26</a:t>
             </a:fld>
             <a:endParaRPr lang="zh-CN" altLang="en-US"/>
           </a:p>
@@ -1925,7 +2010,7 @@
           <a:p>
             <a:fld id="{2D8FB3AA-4DD9-41F8-ACA7-529CA5B761B9}" type="datetimeFigureOut">
               <a:rPr lang="zh-CN" altLang="en-US" smtClean="0"/>
-              <a:t>2023/8/24</a:t>
+              <a:t>2023/8/26</a:t>
             </a:fld>
             <a:endParaRPr lang="zh-CN" altLang="en-US"/>
           </a:p>
@@ -2337,7 +2422,7 @@
           <a:p>
             <a:fld id="{2D8FB3AA-4DD9-41F8-ACA7-529CA5B761B9}" type="datetimeFigureOut">
               <a:rPr lang="zh-CN" altLang="en-US" smtClean="0"/>
-              <a:t>2023/8/24</a:t>
+              <a:t>2023/8/26</a:t>
             </a:fld>
             <a:endParaRPr lang="zh-CN" altLang="en-US"/>
           </a:p>
@@ -2478,7 +2563,7 @@
           <a:p>
             <a:fld id="{2D8FB3AA-4DD9-41F8-ACA7-529CA5B761B9}" type="datetimeFigureOut">
               <a:rPr lang="zh-CN" altLang="en-US" smtClean="0"/>
-              <a:t>2023/8/24</a:t>
+              <a:t>2023/8/26</a:t>
             </a:fld>
             <a:endParaRPr lang="zh-CN" altLang="en-US"/>
           </a:p>
@@ -2591,7 +2676,7 @@
           <a:p>
             <a:fld id="{2D8FB3AA-4DD9-41F8-ACA7-529CA5B761B9}" type="datetimeFigureOut">
               <a:rPr lang="zh-CN" altLang="en-US" smtClean="0"/>
-              <a:t>2023/8/24</a:t>
+              <a:t>2023/8/26</a:t>
             </a:fld>
             <a:endParaRPr lang="zh-CN" altLang="en-US"/>
           </a:p>
@@ -2902,7 +2987,7 @@
           <a:p>
             <a:fld id="{2D8FB3AA-4DD9-41F8-ACA7-529CA5B761B9}" type="datetimeFigureOut">
               <a:rPr lang="zh-CN" altLang="en-US" smtClean="0"/>
-              <a:t>2023/8/24</a:t>
+              <a:t>2023/8/26</a:t>
             </a:fld>
             <a:endParaRPr lang="zh-CN" altLang="en-US"/>
           </a:p>
@@ -3190,7 +3275,7 @@
           <a:p>
             <a:fld id="{2D8FB3AA-4DD9-41F8-ACA7-529CA5B761B9}" type="datetimeFigureOut">
               <a:rPr lang="zh-CN" altLang="en-US" smtClean="0"/>
-              <a:t>2023/8/24</a:t>
+              <a:t>2023/8/26</a:t>
             </a:fld>
             <a:endParaRPr lang="zh-CN" altLang="en-US"/>
           </a:p>
@@ -3431,7 +3516,7 @@
           <a:p>
             <a:fld id="{2D8FB3AA-4DD9-41F8-ACA7-529CA5B761B9}" type="datetimeFigureOut">
               <a:rPr lang="zh-CN" altLang="en-US" smtClean="0"/>
-              <a:t>2023/8/24</a:t>
+              <a:t>2023/8/26</a:t>
             </a:fld>
             <a:endParaRPr lang="zh-CN" altLang="en-US"/>
           </a:p>
@@ -4331,8 +4416,8 @@
         </p:nvSpPr>
         <p:spPr>
           <a:xfrm>
-            <a:off x="914400" y="295677"/>
-            <a:ext cx="10515600" cy="1046986"/>
+            <a:off x="914400" y="156259"/>
+            <a:ext cx="10515600" cy="1024360"/>
           </a:xfrm>
         </p:spPr>
         <p:txBody>
@@ -4344,7 +4429,7 @@
                 <a:latin typeface="微软雅黑" panose="020B0503020204020204" pitchFamily="34" charset="-122"/>
                 <a:ea typeface="微软雅黑" panose="020B0503020204020204" pitchFamily="34" charset="-122"/>
               </a:rPr>
-              <a:t>Large Neighborhood Search</a:t>
+              <a:t>LNS (Agent-Based Neighborhood)</a:t>
             </a:r>
             <a:endParaRPr lang="zh-CN" altLang="en-US" dirty="0">
               <a:latin typeface="微软雅黑" panose="020B0503020204020204" pitchFamily="34" charset="-122"/>
@@ -4369,44 +4454,348 @@
             <p:ph sz="half" idx="1"/>
           </p:nvPr>
         </p:nvSpPr>
-        <p:spPr/>
-        <p:txBody>
-          <a:bodyPr/>
-          <a:lstStyle/>
-          <a:p>
-            <a:endParaRPr lang="zh-CN" altLang="en-US"/>
-          </a:p>
-        </p:txBody>
-      </p:sp>
-      <p:sp>
-        <p:nvSpPr>
-          <p:cNvPr id="4" name="内容占位符 3">
-            <a:extLst>
-              <a:ext uri="{FF2B5EF4-FFF2-40B4-BE49-F238E27FC236}">
-                <a16:creationId xmlns:a16="http://schemas.microsoft.com/office/drawing/2014/main" id="{356E2BCE-93DB-461F-B93E-1C82AD2C7FBA}"/>
-              </a:ext>
-            </a:extLst>
-          </p:cNvPr>
-          <p:cNvSpPr>
-            <a:spLocks noGrp="1"/>
-          </p:cNvSpPr>
+        <p:spPr>
+          <a:xfrm>
+            <a:off x="838200" y="1400537"/>
+            <a:ext cx="5181600" cy="5301203"/>
+          </a:xfrm>
+        </p:spPr>
+        <p:txBody>
+          <a:bodyPr/>
+          <a:lstStyle/>
+          <a:p>
+            <a:pPr>
+              <a:lnSpc>
+                <a:spcPct val="150000"/>
+              </a:lnSpc>
+            </a:pPr>
+            <a:r>
+              <a:rPr lang="zh-CN" altLang="en-US" dirty="0">
+                <a:latin typeface="微软雅黑" panose="020B0503020204020204" pitchFamily="34" charset="-122"/>
+                <a:ea typeface="微软雅黑" panose="020B0503020204020204" pitchFamily="34" charset="-122"/>
+              </a:rPr>
+              <a:t>将路径具有最大延迟的</a:t>
+            </a:r>
+            <a:r>
+              <a:rPr lang="en-US" altLang="zh-CN" dirty="0">
+                <a:latin typeface="微软雅黑" panose="020B0503020204020204" pitchFamily="34" charset="-122"/>
+                <a:ea typeface="微软雅黑" panose="020B0503020204020204" pitchFamily="34" charset="-122"/>
+              </a:rPr>
+              <a:t>agent </a:t>
+            </a:r>
+            <a:r>
+              <a:rPr lang="zh-CN" altLang="en-US" dirty="0">
+                <a:latin typeface="微软雅黑" panose="020B0503020204020204" pitchFamily="34" charset="-122"/>
+                <a:ea typeface="微软雅黑" panose="020B0503020204020204" pitchFamily="34" charset="-122"/>
+              </a:rPr>
+              <a:t>作为初始邻域。</a:t>
+            </a:r>
+            <a:endParaRPr lang="en-US" altLang="zh-CN" dirty="0">
+              <a:latin typeface="微软雅黑" panose="020B0503020204020204" pitchFamily="34" charset="-122"/>
+              <a:ea typeface="微软雅黑" panose="020B0503020204020204" pitchFamily="34" charset="-122"/>
+            </a:endParaRPr>
+          </a:p>
+          <a:p>
+            <a:pPr>
+              <a:lnSpc>
+                <a:spcPct val="150000"/>
+              </a:lnSpc>
+            </a:pPr>
+            <a:r>
+              <a:rPr lang="zh-CN" altLang="en-US" dirty="0">
+                <a:latin typeface="微软雅黑" panose="020B0503020204020204" pitchFamily="34" charset="-122"/>
+                <a:ea typeface="微软雅黑" panose="020B0503020204020204" pitchFamily="34" charset="-122"/>
+              </a:rPr>
+              <a:t>每一轮迭代，从邻域随机选择</a:t>
+            </a:r>
+            <a:r>
+              <a:rPr lang="en-US" altLang="zh-CN" dirty="0">
+                <a:latin typeface="微软雅黑" panose="020B0503020204020204" pitchFamily="34" charset="-122"/>
+                <a:ea typeface="微软雅黑" panose="020B0503020204020204" pitchFamily="34" charset="-122"/>
+              </a:rPr>
+              <a:t>agent</a:t>
+            </a:r>
+            <a:r>
+              <a:rPr lang="zh-CN" altLang="en-US" dirty="0">
+                <a:latin typeface="微软雅黑" panose="020B0503020204020204" pitchFamily="34" charset="-122"/>
+                <a:ea typeface="微软雅黑" panose="020B0503020204020204" pitchFamily="34" charset="-122"/>
+              </a:rPr>
+              <a:t>，随机游走到总路径更短的相邻节点，将更短路径上与其碰撞的</a:t>
+            </a:r>
+            <a:r>
+              <a:rPr lang="en-US" altLang="zh-CN" dirty="0">
+                <a:latin typeface="微软雅黑" panose="020B0503020204020204" pitchFamily="34" charset="-122"/>
+                <a:ea typeface="微软雅黑" panose="020B0503020204020204" pitchFamily="34" charset="-122"/>
+              </a:rPr>
+              <a:t>agent</a:t>
+            </a:r>
+            <a:r>
+              <a:rPr lang="zh-CN" altLang="en-US" dirty="0">
+                <a:latin typeface="微软雅黑" panose="020B0503020204020204" pitchFamily="34" charset="-122"/>
+                <a:ea typeface="微软雅黑" panose="020B0503020204020204" pitchFamily="34" charset="-122"/>
+              </a:rPr>
+              <a:t>添加到邻域</a:t>
+            </a:r>
+            <a:r>
+              <a:rPr lang="en-US" altLang="zh-CN" dirty="0">
+                <a:latin typeface="微软雅黑" panose="020B0503020204020204" pitchFamily="34" charset="-122"/>
+                <a:ea typeface="微软雅黑" panose="020B0503020204020204" pitchFamily="34" charset="-122"/>
+              </a:rPr>
+              <a:t>As</a:t>
+            </a:r>
+            <a:r>
+              <a:rPr lang="zh-CN" altLang="en-US" dirty="0">
+                <a:latin typeface="微软雅黑" panose="020B0503020204020204" pitchFamily="34" charset="-122"/>
+                <a:ea typeface="微软雅黑" panose="020B0503020204020204" pitchFamily="34" charset="-122"/>
+              </a:rPr>
+              <a:t>中。</a:t>
+            </a:r>
+            <a:endParaRPr lang="en-US" altLang="zh-CN" dirty="0">
+              <a:latin typeface="微软雅黑" panose="020B0503020204020204" pitchFamily="34" charset="-122"/>
+              <a:ea typeface="微软雅黑" panose="020B0503020204020204" pitchFamily="34" charset="-122"/>
+            </a:endParaRPr>
+          </a:p>
+          <a:p>
+            <a:pPr>
+              <a:lnSpc>
+                <a:spcPct val="150000"/>
+              </a:lnSpc>
+            </a:pPr>
+            <a:endParaRPr lang="zh-CN" altLang="en-US" dirty="0"/>
+          </a:p>
+        </p:txBody>
+      </p:sp>
+      <p:pic>
+        <p:nvPicPr>
+          <p:cNvPr id="5" name="内容占位符 5">
+            <a:extLst>
+              <a:ext uri="{FF2B5EF4-FFF2-40B4-BE49-F238E27FC236}">
+                <a16:creationId xmlns:a16="http://schemas.microsoft.com/office/drawing/2014/main" id="{7FC0CCCB-4EC7-4927-BAEB-1C86B7100DBF}"/>
+              </a:ext>
+            </a:extLst>
+          </p:cNvPr>
+          <p:cNvPicPr>
+            <a:picLocks noGrp="1" noChangeAspect="1"/>
+          </p:cNvPicPr>
           <p:nvPr>
             <p:ph sz="half" idx="2"/>
           </p:nvPr>
-        </p:nvSpPr>
-        <p:spPr/>
-        <p:txBody>
-          <a:bodyPr/>
-          <a:lstStyle/>
-          <a:p>
-            <a:endParaRPr lang="zh-CN" altLang="en-US"/>
-          </a:p>
-        </p:txBody>
-      </p:sp>
+        </p:nvPicPr>
+        <p:blipFill>
+          <a:blip r:embed="rId3"/>
+          <a:stretch>
+            <a:fillRect/>
+          </a:stretch>
+        </p:blipFill>
+        <p:spPr>
+          <a:xfrm>
+            <a:off x="6492867" y="1138545"/>
+            <a:ext cx="4676703" cy="5563197"/>
+          </a:xfrm>
+        </p:spPr>
+      </p:pic>
     </p:spTree>
     <p:extLst>
       <p:ext uri="{BB962C8B-B14F-4D97-AF65-F5344CB8AC3E}">
         <p14:creationId xmlns:p14="http://schemas.microsoft.com/office/powerpoint/2010/main" val="2883110994"/>
+      </p:ext>
+    </p:extLst>
+  </p:cSld>
+  <p:clrMapOvr>
+    <a:masterClrMapping/>
+  </p:clrMapOvr>
+</p:sld>
+</file>
+
+<file path=ppt/slides/slide4.xml><?xml version="1.0" encoding="utf-8"?>
+<p:sld xmlns:a="http://schemas.openxmlformats.org/drawingml/2006/main" xmlns:r="http://schemas.openxmlformats.org/officeDocument/2006/relationships" xmlns:p="http://schemas.openxmlformats.org/presentationml/2006/main">
+  <p:cSld>
+    <p:spTree>
+      <p:nvGrpSpPr>
+        <p:cNvPr id="1" name=""/>
+        <p:cNvGrpSpPr/>
+        <p:nvPr/>
+      </p:nvGrpSpPr>
+      <p:grpSpPr>
+        <a:xfrm>
+          <a:off x="0" y="0"/>
+          <a:ext cx="0" cy="0"/>
+          <a:chOff x="0" y="0"/>
+          <a:chExt cx="0" cy="0"/>
+        </a:xfrm>
+      </p:grpSpPr>
+      <p:sp>
+        <p:nvSpPr>
+          <p:cNvPr id="2" name="标题 1">
+            <a:extLst>
+              <a:ext uri="{FF2B5EF4-FFF2-40B4-BE49-F238E27FC236}">
+                <a16:creationId xmlns:a16="http://schemas.microsoft.com/office/drawing/2014/main" id="{7BD62733-790C-45D5-B1A2-1F74854F8CD1}"/>
+              </a:ext>
+            </a:extLst>
+          </p:cNvPr>
+          <p:cNvSpPr>
+            <a:spLocks noGrp="1"/>
+          </p:cNvSpPr>
+          <p:nvPr>
+            <p:ph type="title"/>
+          </p:nvPr>
+        </p:nvSpPr>
+        <p:spPr>
+          <a:xfrm>
+            <a:off x="838200" y="173620"/>
+            <a:ext cx="10515600" cy="923619"/>
+          </a:xfrm>
+        </p:spPr>
+        <p:txBody>
+          <a:bodyPr/>
+          <a:lstStyle/>
+          <a:p>
+            <a:r>
+              <a:rPr lang="en-US" altLang="zh-CN" dirty="0">
+                <a:latin typeface="微软雅黑" panose="020B0503020204020204" pitchFamily="34" charset="-122"/>
+                <a:ea typeface="微软雅黑" panose="020B0503020204020204" pitchFamily="34" charset="-122"/>
+              </a:rPr>
+              <a:t>LNS (Map-Based Neighborhood)</a:t>
+            </a:r>
+            <a:endParaRPr lang="zh-CN" altLang="en-US" dirty="0"/>
+          </a:p>
+        </p:txBody>
+      </p:sp>
+      <p:sp>
+        <p:nvSpPr>
+          <p:cNvPr id="3" name="内容占位符 2">
+            <a:extLst>
+              <a:ext uri="{FF2B5EF4-FFF2-40B4-BE49-F238E27FC236}">
+                <a16:creationId xmlns:a16="http://schemas.microsoft.com/office/drawing/2014/main" id="{B04B73D7-6C83-4EC8-94FD-ECE67EA56D36}"/>
+              </a:ext>
+            </a:extLst>
+          </p:cNvPr>
+          <p:cNvSpPr>
+            <a:spLocks noGrp="1"/>
+          </p:cNvSpPr>
+          <p:nvPr>
+            <p:ph sz="half" idx="1"/>
+          </p:nvPr>
+        </p:nvSpPr>
+        <p:spPr>
+          <a:xfrm>
+            <a:off x="838200" y="1377387"/>
+            <a:ext cx="5181600" cy="5306992"/>
+          </a:xfrm>
+        </p:spPr>
+        <p:txBody>
+          <a:bodyPr/>
+          <a:lstStyle/>
+          <a:p>
+            <a:pPr>
+              <a:lnSpc>
+                <a:spcPct val="150000"/>
+              </a:lnSpc>
+            </a:pPr>
+            <a:r>
+              <a:rPr lang="zh-CN" altLang="en-US" dirty="0">
+                <a:latin typeface="微软雅黑" panose="020B0503020204020204" pitchFamily="34" charset="-122"/>
+                <a:ea typeface="微软雅黑" panose="020B0503020204020204" pitchFamily="34" charset="-122"/>
+              </a:rPr>
+              <a:t>从一个随机选择的多条路径交叉点开始，执行广度优先搜索。</a:t>
+            </a:r>
+            <a:endParaRPr lang="en-US" altLang="zh-CN" dirty="0">
+              <a:latin typeface="微软雅黑" panose="020B0503020204020204" pitchFamily="34" charset="-122"/>
+              <a:ea typeface="微软雅黑" panose="020B0503020204020204" pitchFamily="34" charset="-122"/>
+            </a:endParaRPr>
+          </a:p>
+          <a:p>
+            <a:pPr>
+              <a:lnSpc>
+                <a:spcPct val="150000"/>
+              </a:lnSpc>
+            </a:pPr>
+            <a:r>
+              <a:rPr lang="zh-CN" altLang="en-US" dirty="0">
+                <a:latin typeface="微软雅黑" panose="020B0503020204020204" pitchFamily="34" charset="-122"/>
+                <a:ea typeface="微软雅黑" panose="020B0503020204020204" pitchFamily="34" charset="-122"/>
+              </a:rPr>
+              <a:t>每一轮迭代，将在时间窗口内经过当前探索节点的</a:t>
+            </a:r>
+            <a:r>
+              <a:rPr lang="en-US" altLang="zh-CN" dirty="0">
+                <a:latin typeface="微软雅黑" panose="020B0503020204020204" pitchFamily="34" charset="-122"/>
+                <a:ea typeface="微软雅黑" panose="020B0503020204020204" pitchFamily="34" charset="-122"/>
+              </a:rPr>
+              <a:t>agent</a:t>
+            </a:r>
+            <a:r>
+              <a:rPr lang="zh-CN" altLang="en-US" dirty="0">
+                <a:latin typeface="微软雅黑" panose="020B0503020204020204" pitchFamily="34" charset="-122"/>
+                <a:ea typeface="微软雅黑" panose="020B0503020204020204" pitchFamily="34" charset="-122"/>
+              </a:rPr>
+              <a:t>添加到邻域</a:t>
+            </a:r>
+            <a:r>
+              <a:rPr lang="en-US" altLang="zh-CN" dirty="0">
+                <a:latin typeface="微软雅黑" panose="020B0503020204020204" pitchFamily="34" charset="-122"/>
+                <a:ea typeface="微软雅黑" panose="020B0503020204020204" pitchFamily="34" charset="-122"/>
+              </a:rPr>
+              <a:t>As</a:t>
+            </a:r>
+            <a:r>
+              <a:rPr lang="zh-CN" altLang="en-US" dirty="0">
+                <a:latin typeface="微软雅黑" panose="020B0503020204020204" pitchFamily="34" charset="-122"/>
+                <a:ea typeface="微软雅黑" panose="020B0503020204020204" pitchFamily="34" charset="-122"/>
+              </a:rPr>
+              <a:t>中，将探索节点的相邻节点添加到探索队列。</a:t>
+            </a:r>
+            <a:endParaRPr lang="en-US" altLang="zh-CN" dirty="0">
+              <a:latin typeface="微软雅黑" panose="020B0503020204020204" pitchFamily="34" charset="-122"/>
+              <a:ea typeface="微软雅黑" panose="020B0503020204020204" pitchFamily="34" charset="-122"/>
+            </a:endParaRPr>
+          </a:p>
+          <a:p>
+            <a:pPr>
+              <a:lnSpc>
+                <a:spcPct val="150000"/>
+              </a:lnSpc>
+            </a:pPr>
+            <a:endParaRPr lang="zh-CN" altLang="en-US" dirty="0">
+              <a:latin typeface="微软雅黑" panose="020B0503020204020204" pitchFamily="34" charset="-122"/>
+              <a:ea typeface="微软雅黑" panose="020B0503020204020204" pitchFamily="34" charset="-122"/>
+            </a:endParaRPr>
+          </a:p>
+        </p:txBody>
+      </p:sp>
+      <p:pic>
+        <p:nvPicPr>
+          <p:cNvPr id="10" name="内容占位符 9">
+            <a:extLst>
+              <a:ext uri="{FF2B5EF4-FFF2-40B4-BE49-F238E27FC236}">
+                <a16:creationId xmlns:a16="http://schemas.microsoft.com/office/drawing/2014/main" id="{AE9E8296-D64B-471D-8ADE-49E80AB22085}"/>
+              </a:ext>
+            </a:extLst>
+          </p:cNvPr>
+          <p:cNvPicPr>
+            <a:picLocks noGrp="1" noChangeAspect="1"/>
+          </p:cNvPicPr>
+          <p:nvPr>
+            <p:ph sz="half" idx="2"/>
+          </p:nvPr>
+        </p:nvPicPr>
+        <p:blipFill>
+          <a:blip r:embed="rId2"/>
+          <a:stretch>
+            <a:fillRect/>
+          </a:stretch>
+        </p:blipFill>
+        <p:spPr>
+          <a:xfrm>
+            <a:off x="6730121" y="1023590"/>
+            <a:ext cx="4300552" cy="5676066"/>
+          </a:xfrm>
+        </p:spPr>
+      </p:pic>
+    </p:spTree>
+    <p:extLst>
+      <p:ext uri="{BB962C8B-B14F-4D97-AF65-F5344CB8AC3E}">
+        <p14:creationId xmlns:p14="http://schemas.microsoft.com/office/powerpoint/2010/main" val="2201683673"/>
       </p:ext>
     </p:extLst>
   </p:cSld>

</xml_diff>